<commit_message>
Another update to overview workflow figures
Replaced long/short rRNA pipelines and added box to indicate
multisample comparison capabilities
</commit_message>
<xml_diff>
--- a/writing/figures/Phylosift_overview_oct2012.pptx
+++ b/writing/figures/Phylosift_overview_oct2012.pptx
@@ -288,7 +288,7 @@
           <a:p>
             <a:fld id="{1EB31AE5-1B8F-5848-93B8-66F20C8DE389}" type="datetimeFigureOut">
               <a:rPr lang="en-US" smtClean="0"/>
-              <a:t>10/31/12</a:t>
+              <a:t>11/6/12</a:t>
             </a:fld>
             <a:endParaRPr lang="en-US"/>
           </a:p>
@@ -458,7 +458,7 @@
           <a:p>
             <a:fld id="{1EB31AE5-1B8F-5848-93B8-66F20C8DE389}" type="datetimeFigureOut">
               <a:rPr lang="en-US" smtClean="0"/>
-              <a:t>10/31/12</a:t>
+              <a:t>11/6/12</a:t>
             </a:fld>
             <a:endParaRPr lang="en-US"/>
           </a:p>
@@ -638,7 +638,7 @@
           <a:p>
             <a:fld id="{1EB31AE5-1B8F-5848-93B8-66F20C8DE389}" type="datetimeFigureOut">
               <a:rPr lang="en-US" smtClean="0"/>
-              <a:t>10/31/12</a:t>
+              <a:t>11/6/12</a:t>
             </a:fld>
             <a:endParaRPr lang="en-US"/>
           </a:p>
@@ -808,7 +808,7 @@
           <a:p>
             <a:fld id="{1EB31AE5-1B8F-5848-93B8-66F20C8DE389}" type="datetimeFigureOut">
               <a:rPr lang="en-US" smtClean="0"/>
-              <a:t>10/31/12</a:t>
+              <a:t>11/6/12</a:t>
             </a:fld>
             <a:endParaRPr lang="en-US"/>
           </a:p>
@@ -1054,7 +1054,7 @@
           <a:p>
             <a:fld id="{1EB31AE5-1B8F-5848-93B8-66F20C8DE389}" type="datetimeFigureOut">
               <a:rPr lang="en-US" smtClean="0"/>
-              <a:t>10/31/12</a:t>
+              <a:t>11/6/12</a:t>
             </a:fld>
             <a:endParaRPr lang="en-US"/>
           </a:p>
@@ -1342,7 +1342,7 @@
           <a:p>
             <a:fld id="{1EB31AE5-1B8F-5848-93B8-66F20C8DE389}" type="datetimeFigureOut">
               <a:rPr lang="en-US" smtClean="0"/>
-              <a:t>10/31/12</a:t>
+              <a:t>11/6/12</a:t>
             </a:fld>
             <a:endParaRPr lang="en-US"/>
           </a:p>
@@ -1769,7 +1769,7 @@
           <a:p>
             <a:fld id="{1EB31AE5-1B8F-5848-93B8-66F20C8DE389}" type="datetimeFigureOut">
               <a:rPr lang="en-US" smtClean="0"/>
-              <a:t>10/31/12</a:t>
+              <a:t>11/6/12</a:t>
             </a:fld>
             <a:endParaRPr lang="en-US"/>
           </a:p>
@@ -1887,7 +1887,7 @@
           <a:p>
             <a:fld id="{1EB31AE5-1B8F-5848-93B8-66F20C8DE389}" type="datetimeFigureOut">
               <a:rPr lang="en-US" smtClean="0"/>
-              <a:t>10/31/12</a:t>
+              <a:t>11/6/12</a:t>
             </a:fld>
             <a:endParaRPr lang="en-US"/>
           </a:p>
@@ -1982,7 +1982,7 @@
           <a:p>
             <a:fld id="{1EB31AE5-1B8F-5848-93B8-66F20C8DE389}" type="datetimeFigureOut">
               <a:rPr lang="en-US" smtClean="0"/>
-              <a:t>10/31/12</a:t>
+              <a:t>11/6/12</a:t>
             </a:fld>
             <a:endParaRPr lang="en-US"/>
           </a:p>
@@ -2259,7 +2259,7 @@
           <a:p>
             <a:fld id="{1EB31AE5-1B8F-5848-93B8-66F20C8DE389}" type="datetimeFigureOut">
               <a:rPr lang="en-US" smtClean="0"/>
-              <a:t>10/31/12</a:t>
+              <a:t>11/6/12</a:t>
             </a:fld>
             <a:endParaRPr lang="en-US"/>
           </a:p>
@@ -2512,7 +2512,7 @@
           <a:p>
             <a:fld id="{1EB31AE5-1B8F-5848-93B8-66F20C8DE389}" type="datetimeFigureOut">
               <a:rPr lang="en-US" smtClean="0"/>
-              <a:t>10/31/12</a:t>
+              <a:t>11/6/12</a:t>
             </a:fld>
             <a:endParaRPr lang="en-US"/>
           </a:p>
@@ -2725,7 +2725,7 @@
           <a:p>
             <a:fld id="{1EB31AE5-1B8F-5848-93B8-66F20C8DE389}" type="datetimeFigureOut">
               <a:rPr lang="en-US" smtClean="0"/>
-              <a:t>10/31/12</a:t>
+              <a:t>11/6/12</a:t>
             </a:fld>
             <a:endParaRPr lang="en-US"/>
           </a:p>
@@ -3108,8 +3108,8 @@
         </p:nvSpPr>
         <p:spPr>
           <a:xfrm>
-            <a:off x="1562100" y="4127667"/>
-            <a:ext cx="10998200" cy="3238333"/>
+            <a:off x="1562100" y="5067467"/>
+            <a:ext cx="8699500" cy="3238333"/>
           </a:xfrm>
           <a:prstGeom prst="rect">
             <a:avLst/>
@@ -3155,8 +3155,8 @@
         </p:nvSpPr>
         <p:spPr>
           <a:xfrm>
-            <a:off x="1562100" y="1618755"/>
-            <a:ext cx="10998200" cy="1930400"/>
+            <a:off x="1562100" y="1618754"/>
+            <a:ext cx="8699500" cy="2848044"/>
           </a:xfrm>
           <a:prstGeom prst="rect">
             <a:avLst/>
@@ -3283,12 +3283,12 @@
         </p:nvCxnSpPr>
         <p:spPr>
           <a:xfrm rot="16200000" flipH="1">
-            <a:off x="393822" y="2116916"/>
-            <a:ext cx="3691593" cy="2454955"/>
+            <a:off x="-85521" y="2596258"/>
+            <a:ext cx="4650278" cy="2454955"/>
           </a:xfrm>
           <a:prstGeom prst="bentConnector3">
             <a:avLst>
-              <a:gd name="adj1" fmla="val 99884"/>
+              <a:gd name="adj1" fmla="val 99705"/>
             </a:avLst>
           </a:prstGeom>
           <a:ln w="50800">
@@ -3354,19 +3354,17 @@
       <p:cxnSp>
         <p:nvCxnSpPr>
           <p:cNvPr id="59" name="Elbow Connector 58"/>
-          <p:cNvCxnSpPr>
-            <a:stCxn id="81" idx="3"/>
-          </p:cNvCxnSpPr>
+          <p:cNvCxnSpPr/>
           <p:nvPr/>
         </p:nvCxnSpPr>
         <p:spPr>
           <a:xfrm>
-            <a:off x="9613900" y="2583955"/>
-            <a:ext cx="4178300" cy="2013445"/>
+            <a:off x="9626600" y="2583955"/>
+            <a:ext cx="3073400" cy="1617871"/>
           </a:xfrm>
           <a:prstGeom prst="bentConnector3">
             <a:avLst>
-              <a:gd name="adj1" fmla="val 99544"/>
+              <a:gd name="adj1" fmla="val 100413"/>
             </a:avLst>
           </a:prstGeom>
           <a:ln w="50800">
@@ -3402,7 +3400,7 @@
         </p:nvCxnSpPr>
         <p:spPr>
           <a:xfrm>
-            <a:off x="5771024" y="5151744"/>
+            <a:off x="5771024" y="6091544"/>
             <a:ext cx="1467976" cy="0"/>
           </a:xfrm>
           <a:prstGeom prst="straightConnector1">
@@ -3431,45 +3429,6 @@
           </a:fontRef>
         </p:style>
       </p:cxnSp>
-      <p:cxnSp>
-        <p:nvCxnSpPr>
-          <p:cNvPr id="66" name="Straight Arrow Connector 65"/>
-          <p:cNvCxnSpPr>
-            <a:stCxn id="25" idx="3"/>
-          </p:cNvCxnSpPr>
-          <p:nvPr/>
-        </p:nvCxnSpPr>
-        <p:spPr>
-          <a:xfrm>
-            <a:off x="9613900" y="5151925"/>
-            <a:ext cx="2946400" cy="0"/>
-          </a:xfrm>
-          <a:prstGeom prst="straightConnector1">
-            <a:avLst/>
-          </a:prstGeom>
-          <a:ln w="50800">
-            <a:solidFill>
-              <a:schemeClr val="tx1"/>
-            </a:solidFill>
-            <a:tailEnd type="triangle" w="lg" len="med"/>
-          </a:ln>
-          <a:effectLst/>
-        </p:spPr>
-        <p:style>
-          <a:lnRef idx="2">
-            <a:schemeClr val="accent1"/>
-          </a:lnRef>
-          <a:fillRef idx="0">
-            <a:schemeClr val="accent1"/>
-          </a:fillRef>
-          <a:effectRef idx="1">
-            <a:schemeClr val="accent1"/>
-          </a:effectRef>
-          <a:fontRef idx="minor">
-            <a:schemeClr val="tx1"/>
-          </a:fontRef>
-        </p:style>
-      </p:cxnSp>
       <p:sp>
         <p:nvSpPr>
           <p:cNvPr id="69" name="TextBox 68"/>
@@ -3478,7 +3437,7 @@
         </p:nvSpPr>
         <p:spPr>
           <a:xfrm>
-            <a:off x="1663700" y="1663700"/>
+            <a:off x="1663700" y="1511300"/>
             <a:ext cx="1371600" cy="692497"/>
           </a:xfrm>
           <a:prstGeom prst="rect">
@@ -3510,47 +3469,13 @@
       </p:sp>
       <p:sp>
         <p:nvSpPr>
-          <p:cNvPr id="72" name="TextBox 71"/>
-          <p:cNvSpPr txBox="1"/>
-          <p:nvPr/>
-        </p:nvSpPr>
-        <p:spPr>
-          <a:xfrm>
-            <a:off x="10642600" y="3617264"/>
-            <a:ext cx="2298700" cy="369332"/>
-          </a:xfrm>
-          <a:prstGeom prst="rect">
-            <a:avLst/>
-          </a:prstGeom>
-          <a:noFill/>
-        </p:spPr>
-        <p:txBody>
-          <a:bodyPr wrap="square" rtlCol="0">
-            <a:spAutoFit/>
-          </a:bodyPr>
-          <a:lstStyle/>
-          <a:p>
-            <a:r>
-              <a:rPr lang="en-US" sz="1800" dirty="0"/>
-              <a:t>a</a:t>
-            </a:r>
-            <a:r>
-              <a:rPr lang="en-US" sz="1800" dirty="0" smtClean="0"/>
-              <a:t>lignment masking</a:t>
-            </a:r>
-            <a:endParaRPr lang="en-US" sz="1800" dirty="0"/>
-          </a:p>
-        </p:txBody>
-      </p:sp>
-      <p:sp>
-        <p:nvSpPr>
           <p:cNvPr id="77" name="TextBox 76"/>
           <p:cNvSpPr txBox="1"/>
           <p:nvPr/>
         </p:nvSpPr>
         <p:spPr>
           <a:xfrm>
-            <a:off x="1638300" y="4055848"/>
+            <a:off x="1638300" y="4995648"/>
             <a:ext cx="1714500" cy="692497"/>
           </a:xfrm>
           <a:prstGeom prst="rect">
@@ -3588,7 +3513,7 @@
         </p:nvSpPr>
         <p:spPr>
           <a:xfrm>
-            <a:off x="6634630" y="3526998"/>
+            <a:off x="6634630" y="4466798"/>
             <a:ext cx="3512670" cy="646331"/>
           </a:xfrm>
           <a:prstGeom prst="rect">
@@ -3605,15 +3530,7 @@
             <a:pPr algn="ctr"/>
             <a:r>
               <a:rPr lang="en-US" sz="1800" dirty="0" smtClean="0"/>
-              <a:t>profile </a:t>
-            </a:r>
-            <a:r>
-              <a:rPr lang="en-US" sz="1800" dirty="0" smtClean="0"/>
-              <a:t>HMMs used to align candidates to reference </a:t>
-            </a:r>
-            <a:r>
-              <a:rPr lang="en-US" sz="1800" dirty="0" smtClean="0"/>
-              <a:t>alignment </a:t>
+              <a:t>profile HMMs used to align candidates to reference alignment </a:t>
             </a:r>
             <a:endParaRPr lang="en-US" sz="1800" dirty="0"/>
           </a:p>
@@ -3692,43 +3609,6 @@
           </a:fontRef>
         </p:style>
       </p:cxnSp>
-      <p:cxnSp>
-        <p:nvCxnSpPr>
-          <p:cNvPr id="91" name="Straight Arrow Connector 90"/>
-          <p:cNvCxnSpPr/>
-          <p:nvPr/>
-        </p:nvCxnSpPr>
-        <p:spPr>
-          <a:xfrm>
-            <a:off x="13798550" y="5634178"/>
-            <a:ext cx="0" cy="601522"/>
-          </a:xfrm>
-          <a:prstGeom prst="straightConnector1">
-            <a:avLst/>
-          </a:prstGeom>
-          <a:ln w="50800">
-            <a:solidFill>
-              <a:schemeClr val="tx1"/>
-            </a:solidFill>
-            <a:tailEnd type="triangle" w="lg" len="med"/>
-          </a:ln>
-          <a:effectLst/>
-        </p:spPr>
-        <p:style>
-          <a:lnRef idx="2">
-            <a:schemeClr val="accent1"/>
-          </a:lnRef>
-          <a:fillRef idx="0">
-            <a:schemeClr val="accent1"/>
-          </a:fillRef>
-          <a:effectRef idx="1">
-            <a:schemeClr val="accent1"/>
-          </a:effectRef>
-          <a:fontRef idx="minor">
-            <a:schemeClr val="tx1"/>
-          </a:fontRef>
-        </p:style>
-      </p:cxnSp>
       <p:grpSp>
         <p:nvGrpSpPr>
           <p:cNvPr id="94" name="Group 93"/>
@@ -3737,7 +3617,7 @@
         </p:nvGrpSpPr>
         <p:grpSpPr>
           <a:xfrm>
-            <a:off x="12636500" y="6320484"/>
+            <a:off x="13906500" y="2841893"/>
             <a:ext cx="2298700" cy="952500"/>
             <a:chOff x="4191000" y="2908300"/>
             <a:chExt cx="2298700" cy="952500"/>
@@ -3819,7 +3699,14 @@
                   <a:latin typeface="Helvetica Neue"/>
                   <a:cs typeface="Helvetica Neue"/>
                 </a:rPr>
-                <a:t>Taxonomic Summary</a:t>
+                <a:t>Taxonomic </a:t>
+              </a:r>
+              <a:r>
+                <a:rPr lang="en-US" sz="2400" dirty="0" smtClean="0">
+                  <a:latin typeface="Helvetica Neue"/>
+                  <a:cs typeface="Helvetica Neue"/>
+                </a:rPr>
+                <a:t>Summaries</a:t>
               </a:r>
               <a:endParaRPr lang="en-US" sz="2400" dirty="0">
                 <a:latin typeface="Helvetica Neue"/>
@@ -3837,50 +3724,8 @@
         </p:nvCxnSpPr>
         <p:spPr>
           <a:xfrm>
-            <a:off x="5816600" y="6463425"/>
+            <a:off x="5816600" y="7403225"/>
             <a:ext cx="1460500" cy="0"/>
-          </a:xfrm>
-          <a:prstGeom prst="straightConnector1">
-            <a:avLst/>
-          </a:prstGeom>
-          <a:ln w="50800">
-            <a:solidFill>
-              <a:schemeClr val="bg1">
-                <a:lumMod val="50000"/>
-              </a:schemeClr>
-            </a:solidFill>
-            <a:prstDash val="sysDot"/>
-            <a:tailEnd type="triangle" w="lg" len="med"/>
-          </a:ln>
-          <a:effectLst/>
-        </p:spPr>
-        <p:style>
-          <a:lnRef idx="2">
-            <a:schemeClr val="accent1"/>
-          </a:lnRef>
-          <a:fillRef idx="0">
-            <a:schemeClr val="accent1"/>
-          </a:fillRef>
-          <a:effectRef idx="1">
-            <a:schemeClr val="accent1"/>
-          </a:effectRef>
-          <a:fontRef idx="minor">
-            <a:schemeClr val="tx1"/>
-          </a:fontRef>
-        </p:style>
-      </p:cxnSp>
-      <p:cxnSp>
-        <p:nvCxnSpPr>
-          <p:cNvPr id="122" name="Straight Arrow Connector 121"/>
-          <p:cNvCxnSpPr>
-            <a:stCxn id="132" idx="3"/>
-          </p:cNvCxnSpPr>
-          <p:nvPr/>
-        </p:nvCxnSpPr>
-        <p:spPr>
-          <a:xfrm flipV="1">
-            <a:off x="9613900" y="5367991"/>
-            <a:ext cx="2946400" cy="1056986"/>
           </a:xfrm>
           <a:prstGeom prst="straightConnector1">
             <a:avLst/>
@@ -3919,7 +3764,7 @@
         </p:nvCxnSpPr>
         <p:spPr>
           <a:xfrm>
-            <a:off x="1012140" y="5311876"/>
+            <a:off x="1037540" y="6200876"/>
             <a:ext cx="2366060" cy="1084808"/>
           </a:xfrm>
           <a:prstGeom prst="straightConnector1">
@@ -3959,7 +3804,7 @@
         </p:nvSpPr>
         <p:spPr>
           <a:xfrm rot="1505908">
-            <a:off x="1622364" y="5964834"/>
+            <a:off x="1647764" y="6866534"/>
             <a:ext cx="1697185" cy="369332"/>
           </a:xfrm>
           <a:prstGeom prst="rect">
@@ -4136,15 +3981,7 @@
               <a:pPr algn="ctr"/>
               <a:r>
                 <a:rPr lang="en-US" sz="1800" dirty="0" smtClean="0"/>
-                <a:t>multiple</a:t>
-              </a:r>
-              <a:r>
-                <a:rPr lang="en-US" sz="1800" dirty="0" smtClean="0"/>
-                <a:t> </a:t>
-              </a:r>
-              <a:r>
-                <a:rPr lang="en-US" sz="1800" dirty="0" smtClean="0"/>
-                <a:t>alignment</a:t>
+                <a:t>multiple alignment</a:t>
               </a:r>
               <a:endParaRPr lang="en-US" sz="1800" dirty="0"/>
             </a:p>
@@ -4159,7 +3996,7 @@
         </p:nvGrpSpPr>
         <p:grpSpPr>
           <a:xfrm>
-            <a:off x="3319928" y="4675494"/>
+            <a:off x="3319928" y="5615294"/>
             <a:ext cx="2641600" cy="952500"/>
             <a:chOff x="2997204" y="5785197"/>
             <a:chExt cx="2641600" cy="952500"/>
@@ -4310,7 +4147,7 @@
         </p:nvGrpSpPr>
         <p:grpSpPr>
           <a:xfrm>
-            <a:off x="12636500" y="4688375"/>
+            <a:off x="11099800" y="4305300"/>
             <a:ext cx="2298700" cy="952500"/>
             <a:chOff x="4191000" y="2908300"/>
             <a:chExt cx="2298700" cy="952500"/>
@@ -4410,7 +4247,7 @@
         </p:nvSpPr>
         <p:spPr>
           <a:xfrm>
-            <a:off x="12560300" y="5209075"/>
+            <a:off x="11023600" y="4826000"/>
             <a:ext cx="2463800" cy="338554"/>
           </a:xfrm>
           <a:prstGeom prst="rect">
@@ -4596,7 +4433,7 @@
         </p:nvGrpSpPr>
         <p:grpSpPr>
           <a:xfrm>
-            <a:off x="3319928" y="5948727"/>
+            <a:off x="3319928" y="6888527"/>
             <a:ext cx="2641600" cy="952500"/>
             <a:chOff x="2997204" y="5785197"/>
             <a:chExt cx="2641600" cy="952500"/>
@@ -4787,7 +4624,7 @@
         </p:nvSpPr>
         <p:spPr>
           <a:xfrm>
-            <a:off x="2857500" y="3615898"/>
+            <a:off x="2857500" y="4555698"/>
             <a:ext cx="3606800" cy="646331"/>
           </a:xfrm>
           <a:prstGeom prst="rect">
@@ -4825,7 +4662,7 @@
         </p:nvGrpSpPr>
         <p:grpSpPr>
           <a:xfrm>
-            <a:off x="7315200" y="4675675"/>
+            <a:off x="7315200" y="5615475"/>
             <a:ext cx="2311400" cy="952500"/>
             <a:chOff x="10020300" y="5785197"/>
             <a:chExt cx="2311400" cy="952500"/>
@@ -4956,7 +4793,7 @@
         </p:nvGrpSpPr>
         <p:grpSpPr>
           <a:xfrm>
-            <a:off x="7315200" y="5948727"/>
+            <a:off x="7315200" y="6888527"/>
             <a:ext cx="2311400" cy="952500"/>
             <a:chOff x="10020300" y="5785197"/>
             <a:chExt cx="2311400" cy="952500"/>
@@ -5093,36 +4930,219 @@
           </p:txBody>
         </p:sp>
       </p:grpSp>
+      <p:cxnSp>
+        <p:nvCxnSpPr>
+          <p:cNvPr id="64" name="Straight Arrow Connector 63"/>
+          <p:cNvCxnSpPr/>
+          <p:nvPr/>
+        </p:nvCxnSpPr>
+        <p:spPr>
+          <a:xfrm>
+            <a:off x="5765796" y="3810000"/>
+            <a:ext cx="1511304" cy="0"/>
+          </a:xfrm>
+          <a:prstGeom prst="straightConnector1">
+            <a:avLst/>
+          </a:prstGeom>
+          <a:ln w="50800">
+            <a:solidFill>
+              <a:schemeClr val="tx1"/>
+            </a:solidFill>
+            <a:tailEnd type="triangle" w="lg" len="med"/>
+          </a:ln>
+          <a:effectLst/>
+        </p:spPr>
+        <p:style>
+          <a:lnRef idx="2">
+            <a:schemeClr val="accent1"/>
+          </a:lnRef>
+          <a:fillRef idx="0">
+            <a:schemeClr val="accent1"/>
+          </a:fillRef>
+          <a:effectRef idx="1">
+            <a:schemeClr val="accent1"/>
+          </a:effectRef>
+          <a:fontRef idx="minor">
+            <a:schemeClr val="tx1"/>
+          </a:fontRef>
+        </p:style>
+      </p:cxnSp>
       <p:grpSp>
         <p:nvGrpSpPr>
-          <p:cNvPr id="112" name="Group 111"/>
+          <p:cNvPr id="65" name="Group 64"/>
           <p:cNvGrpSpPr/>
           <p:nvPr/>
         </p:nvGrpSpPr>
         <p:grpSpPr>
           <a:xfrm>
-            <a:off x="2743200" y="3625416"/>
-            <a:ext cx="368300" cy="409749"/>
-            <a:chOff x="6502400" y="530051"/>
-            <a:chExt cx="368300" cy="409749"/>
+            <a:off x="7315200" y="3314205"/>
+            <a:ext cx="2311400" cy="952500"/>
+            <a:chOff x="6642100" y="1905000"/>
+            <a:chExt cx="2311400" cy="952500"/>
+          </a:xfrm>
+        </p:grpSpPr>
+        <p:grpSp>
+          <p:nvGrpSpPr>
+            <p:cNvPr id="67" name="Group 66"/>
+            <p:cNvGrpSpPr/>
+            <p:nvPr/>
+          </p:nvGrpSpPr>
+          <p:grpSpPr>
+            <a:xfrm>
+              <a:off x="6642100" y="1905000"/>
+              <a:ext cx="2298700" cy="952500"/>
+              <a:chOff x="4191000" y="2908300"/>
+              <a:chExt cx="2298700" cy="952500"/>
+            </a:xfrm>
+          </p:grpSpPr>
+          <p:sp>
+            <p:nvSpPr>
+              <p:cNvPr id="71" name="Rounded Rectangle 70"/>
+              <p:cNvSpPr/>
+              <p:nvPr/>
+            </p:nvSpPr>
+            <p:spPr>
+              <a:xfrm>
+                <a:off x="4191000" y="2908300"/>
+                <a:ext cx="2298700" cy="952500"/>
+              </a:xfrm>
+              <a:prstGeom prst="roundRect">
+                <a:avLst/>
+              </a:prstGeom>
+              <a:noFill/>
+              <a:ln>
+                <a:solidFill>
+                  <a:schemeClr val="tx1"/>
+                </a:solidFill>
+              </a:ln>
+              <a:effectLst/>
+            </p:spPr>
+            <p:style>
+              <a:lnRef idx="1">
+                <a:schemeClr val="accent1"/>
+              </a:lnRef>
+              <a:fillRef idx="3">
+                <a:schemeClr val="accent1"/>
+              </a:fillRef>
+              <a:effectRef idx="2">
+                <a:schemeClr val="accent1"/>
+              </a:effectRef>
+              <a:fontRef idx="minor">
+                <a:schemeClr val="lt1"/>
+              </a:fontRef>
+            </p:style>
+            <p:txBody>
+              <a:bodyPr rtlCol="0" anchor="ctr"/>
+              <a:lstStyle/>
+              <a:p>
+                <a:pPr algn="ctr"/>
+                <a:endParaRPr lang="en-US">
+                  <a:latin typeface="Georgia"/>
+                  <a:cs typeface="Georgia"/>
+                </a:endParaRPr>
+              </a:p>
+            </p:txBody>
+          </p:sp>
+          <p:sp>
+            <p:nvSpPr>
+              <p:cNvPr id="73" name="TextBox 72"/>
+              <p:cNvSpPr txBox="1"/>
+              <p:nvPr/>
+            </p:nvSpPr>
+            <p:spPr>
+              <a:xfrm>
+                <a:off x="4368800" y="3028950"/>
+                <a:ext cx="2032000" cy="553998"/>
+              </a:xfrm>
+              <a:prstGeom prst="rect">
+                <a:avLst/>
+              </a:prstGeom>
+              <a:noFill/>
+            </p:spPr>
+            <p:txBody>
+              <a:bodyPr wrap="square" rtlCol="0">
+                <a:spAutoFit/>
+              </a:bodyPr>
+              <a:lstStyle/>
+              <a:p>
+                <a:pPr algn="ctr"/>
+                <a:r>
+                  <a:rPr lang="en-US" sz="3000" dirty="0" smtClean="0">
+                    <a:latin typeface="Helvetica Neue"/>
+                    <a:cs typeface="Helvetica Neue"/>
+                  </a:rPr>
+                  <a:t>Infernal</a:t>
+                </a:r>
+                <a:endParaRPr lang="en-US" sz="3000" dirty="0">
+                  <a:latin typeface="Helvetica Neue"/>
+                  <a:cs typeface="Helvetica Neue"/>
+                </a:endParaRPr>
+              </a:p>
+            </p:txBody>
+          </p:sp>
+        </p:grpSp>
+        <p:sp>
+          <p:nvSpPr>
+            <p:cNvPr id="70" name="TextBox 69"/>
+            <p:cNvSpPr txBox="1"/>
+            <p:nvPr/>
+          </p:nvSpPr>
+          <p:spPr>
+            <a:xfrm>
+              <a:off x="6642100" y="2451100"/>
+              <a:ext cx="2311400" cy="369332"/>
+            </a:xfrm>
+            <a:prstGeom prst="rect">
+              <a:avLst/>
+            </a:prstGeom>
+            <a:noFill/>
+          </p:spPr>
+          <p:txBody>
+            <a:bodyPr wrap="square" rtlCol="0">
+              <a:spAutoFit/>
+            </a:bodyPr>
+            <a:lstStyle/>
+            <a:p>
+              <a:pPr algn="ctr"/>
+              <a:r>
+                <a:rPr lang="en-US" sz="1800" dirty="0" smtClean="0"/>
+                <a:t>multiple alignment</a:t>
+              </a:r>
+              <a:endParaRPr lang="en-US" sz="1800" dirty="0"/>
+            </a:p>
+          </p:txBody>
+        </p:sp>
+      </p:grpSp>
+      <p:grpSp>
+        <p:nvGrpSpPr>
+          <p:cNvPr id="74" name="Group 73"/>
+          <p:cNvGrpSpPr/>
+          <p:nvPr/>
+        </p:nvGrpSpPr>
+        <p:grpSpPr>
+          <a:xfrm>
+            <a:off x="3314700" y="3317796"/>
+            <a:ext cx="2641600" cy="952500"/>
+            <a:chOff x="2997204" y="6407497"/>
+            <a:chExt cx="2641600" cy="952500"/>
           </a:xfrm>
         </p:grpSpPr>
         <p:sp>
           <p:nvSpPr>
-            <p:cNvPr id="113" name="Oval 112"/>
+            <p:cNvPr id="75" name="Rounded Rectangle 74"/>
             <p:cNvSpPr/>
             <p:nvPr/>
           </p:nvSpPr>
           <p:spPr>
             <a:xfrm>
-              <a:off x="6502400" y="546100"/>
-              <a:ext cx="368300" cy="393700"/>
+              <a:off x="3149600" y="6407497"/>
+              <a:ext cx="2298700" cy="952500"/>
             </a:xfrm>
-            <a:prstGeom prst="ellipse">
+            <a:prstGeom prst="roundRect">
               <a:avLst/>
             </a:prstGeom>
             <a:noFill/>
-            <a:ln w="25400">
+            <a:ln>
               <a:solidFill>
                 <a:schemeClr val="tx1"/>
               </a:solidFill>
@@ -5148,20 +5168,23 @@
             <a:lstStyle/>
             <a:p>
               <a:pPr algn="ctr"/>
-              <a:endParaRPr lang="en-US"/>
+              <a:endParaRPr lang="en-US">
+                <a:latin typeface="Georgia"/>
+                <a:cs typeface="Georgia"/>
+              </a:endParaRPr>
             </a:p>
           </p:txBody>
         </p:sp>
         <p:sp>
           <p:nvSpPr>
-            <p:cNvPr id="117" name="TextBox 116"/>
+            <p:cNvPr id="79" name="TextBox 78"/>
             <p:cNvSpPr txBox="1"/>
             <p:nvPr/>
           </p:nvSpPr>
           <p:spPr>
             <a:xfrm>
-              <a:off x="6537323" y="530051"/>
-              <a:ext cx="301660" cy="369332"/>
+              <a:off x="3289300" y="6407497"/>
+              <a:ext cx="2032000" cy="692497"/>
             </a:xfrm>
             <a:prstGeom prst="rect">
               <a:avLst/>
@@ -5169,50 +5192,227 @@
             <a:noFill/>
           </p:spPr>
           <p:txBody>
-            <a:bodyPr wrap="none" rtlCol="0">
+            <a:bodyPr wrap="square" rtlCol="0">
               <a:spAutoFit/>
             </a:bodyPr>
             <a:lstStyle/>
             <a:p>
+              <a:pPr algn="ctr"/>
+              <a:r>
+                <a:rPr lang="en-US" dirty="0" smtClean="0">
+                  <a:latin typeface="Helvetica Neue"/>
+                  <a:cs typeface="Helvetica Neue"/>
+                </a:rPr>
+                <a:t>LAST</a:t>
+              </a:r>
+              <a:endParaRPr lang="en-US" dirty="0">
+                <a:latin typeface="Helvetica Neue"/>
+                <a:cs typeface="Helvetica Neue"/>
+              </a:endParaRPr>
+            </a:p>
+          </p:txBody>
+        </p:sp>
+        <p:sp>
+          <p:nvSpPr>
+            <p:cNvPr id="83" name="TextBox 82"/>
+            <p:cNvSpPr txBox="1"/>
+            <p:nvPr/>
+          </p:nvSpPr>
+          <p:spPr>
+            <a:xfrm>
+              <a:off x="2997204" y="6922195"/>
+              <a:ext cx="2641600" cy="369332"/>
+            </a:xfrm>
+            <a:prstGeom prst="rect">
+              <a:avLst/>
+            </a:prstGeom>
+            <a:noFill/>
+          </p:spPr>
+          <p:txBody>
+            <a:bodyPr wrap="square" rtlCol="0">
+              <a:spAutoFit/>
+            </a:bodyPr>
+            <a:lstStyle/>
+            <a:p>
+              <a:pPr algn="ctr"/>
+              <a:r>
+                <a:rPr lang="en-US" sz="1800" dirty="0"/>
+                <a:t>f</a:t>
+              </a:r>
               <a:r>
                 <a:rPr lang="en-US" sz="1800" dirty="0" smtClean="0"/>
-                <a:t>1</a:t>
+                <a:t>ast </a:t>
+              </a:r>
+              <a:r>
+                <a:rPr lang="en-US" sz="1800" dirty="0"/>
+                <a:t>c</a:t>
+              </a:r>
+              <a:r>
+                <a:rPr lang="en-US" sz="1800" dirty="0" smtClean="0"/>
+                <a:t>andidate </a:t>
+              </a:r>
+              <a:r>
+                <a:rPr lang="en-US" sz="1800" dirty="0"/>
+                <a:t>s</a:t>
+              </a:r>
+              <a:r>
+                <a:rPr lang="en-US" sz="1800" dirty="0" smtClean="0"/>
+                <a:t>earch</a:t>
               </a:r>
               <a:endParaRPr lang="en-US" sz="1800" dirty="0"/>
             </a:p>
           </p:txBody>
         </p:sp>
       </p:grpSp>
+      <p:cxnSp>
+        <p:nvCxnSpPr>
+          <p:cNvPr id="6" name="Elbow Connector 5"/>
+          <p:cNvCxnSpPr/>
+          <p:nvPr/>
+        </p:nvCxnSpPr>
+        <p:spPr>
+          <a:xfrm>
+            <a:off x="1327150" y="2563873"/>
+            <a:ext cx="2028706" cy="1246127"/>
+          </a:xfrm>
+          <a:prstGeom prst="bentConnector3">
+            <a:avLst>
+              <a:gd name="adj1" fmla="val -81"/>
+            </a:avLst>
+          </a:prstGeom>
+          <a:ln w="50800">
+            <a:solidFill>
+              <a:schemeClr val="tx1"/>
+            </a:solidFill>
+            <a:tailEnd type="triangle" w="lg" len="med"/>
+          </a:ln>
+          <a:effectLst/>
+        </p:spPr>
+        <p:style>
+          <a:lnRef idx="2">
+            <a:schemeClr val="accent1"/>
+          </a:lnRef>
+          <a:fillRef idx="0">
+            <a:schemeClr val="accent1"/>
+          </a:fillRef>
+          <a:effectRef idx="1">
+            <a:schemeClr val="accent1"/>
+          </a:effectRef>
+          <a:fontRef idx="minor">
+            <a:schemeClr val="tx1"/>
+          </a:fontRef>
+        </p:style>
+      </p:cxnSp>
+      <p:sp>
+        <p:nvSpPr>
+          <p:cNvPr id="90" name="TextBox 89"/>
+          <p:cNvSpPr txBox="1"/>
+          <p:nvPr/>
+        </p:nvSpPr>
+        <p:spPr>
+          <a:xfrm>
+            <a:off x="1803400" y="2195920"/>
+            <a:ext cx="1308100" cy="369332"/>
+          </a:xfrm>
+          <a:prstGeom prst="rect">
+            <a:avLst/>
+          </a:prstGeom>
+          <a:noFill/>
+        </p:spPr>
+        <p:txBody>
+          <a:bodyPr wrap="square" rtlCol="0">
+            <a:spAutoFit/>
+          </a:bodyPr>
+          <a:lstStyle/>
+          <a:p>
+            <a:r>
+              <a:rPr lang="en-US" sz="1800" dirty="0" smtClean="0"/>
+              <a:t>&lt;6</a:t>
+            </a:r>
+            <a:r>
+              <a:rPr lang="en-US" sz="1800" dirty="0" smtClean="0"/>
+              <a:t>00 </a:t>
+            </a:r>
+            <a:r>
+              <a:rPr lang="en-US" sz="1800" dirty="0" err="1" smtClean="0"/>
+              <a:t>bp</a:t>
+            </a:r>
+            <a:endParaRPr lang="en-US" sz="1800" dirty="0"/>
+          </a:p>
+        </p:txBody>
+      </p:sp>
+      <p:sp>
+        <p:nvSpPr>
+          <p:cNvPr id="93" name="TextBox 92"/>
+          <p:cNvSpPr txBox="1"/>
+          <p:nvPr/>
+        </p:nvSpPr>
+        <p:spPr>
+          <a:xfrm>
+            <a:off x="1803400" y="3409455"/>
+            <a:ext cx="1308100" cy="369332"/>
+          </a:xfrm>
+          <a:prstGeom prst="rect">
+            <a:avLst/>
+          </a:prstGeom>
+          <a:noFill/>
+        </p:spPr>
+        <p:txBody>
+          <a:bodyPr wrap="square" rtlCol="0">
+            <a:spAutoFit/>
+          </a:bodyPr>
+          <a:lstStyle/>
+          <a:p>
+            <a:r>
+              <a:rPr lang="en-US" sz="1800" dirty="0" smtClean="0"/>
+              <a:t>&gt;</a:t>
+            </a:r>
+            <a:r>
+              <a:rPr lang="en-US" sz="1800" dirty="0"/>
+              <a:t>6</a:t>
+            </a:r>
+            <a:r>
+              <a:rPr lang="en-US" sz="1800" dirty="0" smtClean="0"/>
+              <a:t>00 </a:t>
+            </a:r>
+            <a:r>
+              <a:rPr lang="en-US" sz="1800" dirty="0" err="1" smtClean="0"/>
+              <a:t>bp</a:t>
+            </a:r>
+            <a:endParaRPr lang="en-US" sz="1800" dirty="0"/>
+          </a:p>
+        </p:txBody>
+      </p:sp>
       <p:grpSp>
         <p:nvGrpSpPr>
-          <p:cNvPr id="118" name="Group 117"/>
+          <p:cNvPr id="111" name="Group 110"/>
           <p:cNvGrpSpPr/>
           <p:nvPr/>
         </p:nvGrpSpPr>
         <p:grpSpPr>
           <a:xfrm>
-            <a:off x="6367930" y="3646099"/>
-            <a:ext cx="368300" cy="409749"/>
-            <a:chOff x="6502400" y="530051"/>
-            <a:chExt cx="368300" cy="409749"/>
+            <a:off x="13906500" y="5869641"/>
+            <a:ext cx="2298700" cy="952500"/>
+            <a:chOff x="4191000" y="2908300"/>
+            <a:chExt cx="2298700" cy="952500"/>
           </a:xfrm>
         </p:grpSpPr>
         <p:sp>
           <p:nvSpPr>
-            <p:cNvPr id="119" name="Oval 118"/>
+            <p:cNvPr id="114" name="Rounded Rectangle 113"/>
             <p:cNvSpPr/>
             <p:nvPr/>
           </p:nvSpPr>
           <p:spPr>
             <a:xfrm>
-              <a:off x="6502400" y="546100"/>
-              <a:ext cx="368300" cy="393700"/>
+              <a:off x="4191000" y="2908300"/>
+              <a:ext cx="2298700" cy="952500"/>
             </a:xfrm>
-            <a:prstGeom prst="ellipse">
+            <a:prstGeom prst="roundRect">
               <a:avLst/>
             </a:prstGeom>
             <a:noFill/>
-            <a:ln w="25400">
+            <a:ln>
               <a:solidFill>
                 <a:schemeClr val="tx1"/>
               </a:solidFill>
@@ -5238,20 +5438,23 @@
             <a:lstStyle/>
             <a:p>
               <a:pPr algn="ctr"/>
-              <a:endParaRPr lang="en-US"/>
+              <a:endParaRPr lang="en-US">
+                <a:latin typeface="Georgia"/>
+                <a:cs typeface="Georgia"/>
+              </a:endParaRPr>
             </a:p>
           </p:txBody>
         </p:sp>
         <p:sp>
           <p:nvSpPr>
-            <p:cNvPr id="135" name="TextBox 134"/>
+            <p:cNvPr id="115" name="TextBox 114"/>
             <p:cNvSpPr txBox="1"/>
             <p:nvPr/>
           </p:nvSpPr>
           <p:spPr>
             <a:xfrm>
-              <a:off x="6537323" y="530051"/>
-              <a:ext cx="301660" cy="369332"/>
+              <a:off x="4191000" y="3022600"/>
+              <a:ext cx="2298700" cy="707886"/>
             </a:xfrm>
             <a:prstGeom prst="rect">
               <a:avLst/>
@@ -5259,110 +5462,324 @@
             <a:noFill/>
           </p:spPr>
           <p:txBody>
-            <a:bodyPr wrap="none" rtlCol="0">
+            <a:bodyPr wrap="square" rtlCol="0">
               <a:spAutoFit/>
             </a:bodyPr>
             <a:lstStyle/>
             <a:p>
+              <a:pPr algn="ctr"/>
               <a:r>
-                <a:rPr lang="en-US" sz="1800" dirty="0"/>
-                <a:t>2</a:t>
+                <a:rPr lang="en-US" sz="2000" dirty="0" smtClean="0">
+                  <a:latin typeface="Helvetica Neue"/>
+                  <a:cs typeface="Helvetica Neue"/>
+                </a:rPr>
+                <a:t>Sample Analysis &amp; Comparison</a:t>
               </a:r>
-              <a:endParaRPr lang="en-US" sz="1800" dirty="0"/>
+              <a:endParaRPr lang="en-US" sz="2000" dirty="0">
+                <a:latin typeface="Helvetica Neue"/>
+                <a:cs typeface="Helvetica Neue"/>
+              </a:endParaRPr>
             </a:p>
           </p:txBody>
         </p:sp>
       </p:grpSp>
-      <p:grpSp>
-        <p:nvGrpSpPr>
-          <p:cNvPr id="136" name="Group 135"/>
-          <p:cNvGrpSpPr/>
+      <p:cxnSp>
+        <p:nvCxnSpPr>
+          <p:cNvPr id="116" name="Elbow Connector 115"/>
+          <p:cNvCxnSpPr/>
           <p:nvPr/>
-        </p:nvGrpSpPr>
-        <p:grpSpPr>
+        </p:nvCxnSpPr>
+        <p:spPr>
           <a:xfrm>
-            <a:off x="10274300" y="3636661"/>
-            <a:ext cx="368300" cy="409749"/>
-            <a:chOff x="6502400" y="530051"/>
-            <a:chExt cx="368300" cy="409749"/>
-          </a:xfrm>
-        </p:grpSpPr>
-        <p:sp>
-          <p:nvSpPr>
-            <p:cNvPr id="137" name="Oval 136"/>
-            <p:cNvSpPr/>
-            <p:nvPr/>
-          </p:nvSpPr>
-          <p:spPr>
-            <a:xfrm>
-              <a:off x="6502400" y="546100"/>
-              <a:ext cx="368300" cy="393700"/>
-            </a:xfrm>
-            <a:prstGeom prst="ellipse">
-              <a:avLst/>
-            </a:prstGeom>
-            <a:noFill/>
-            <a:ln w="25400">
-              <a:solidFill>
-                <a:schemeClr val="tx1"/>
-              </a:solidFill>
-            </a:ln>
-            <a:effectLst/>
-          </p:spPr>
-          <p:style>
-            <a:lnRef idx="1">
-              <a:schemeClr val="accent1"/>
-            </a:lnRef>
-            <a:fillRef idx="3">
-              <a:schemeClr val="accent1"/>
-            </a:fillRef>
-            <a:effectRef idx="2">
-              <a:schemeClr val="accent1"/>
-            </a:effectRef>
-            <a:fontRef idx="minor">
-              <a:schemeClr val="lt1"/>
-            </a:fontRef>
-          </p:style>
-          <p:txBody>
-            <a:bodyPr rtlCol="0" anchor="ctr"/>
-            <a:lstStyle/>
-            <a:p>
-              <a:pPr algn="ctr"/>
-              <a:endParaRPr lang="en-US"/>
-            </a:p>
-          </p:txBody>
-        </p:sp>
-        <p:sp>
-          <p:nvSpPr>
-            <p:cNvPr id="139" name="TextBox 138"/>
-            <p:cNvSpPr txBox="1"/>
-            <p:nvPr/>
-          </p:nvSpPr>
-          <p:spPr>
-            <a:xfrm>
-              <a:off x="6537323" y="530051"/>
-              <a:ext cx="301660" cy="369332"/>
-            </a:xfrm>
-            <a:prstGeom prst="rect">
-              <a:avLst/>
-            </a:prstGeom>
-            <a:noFill/>
-          </p:spPr>
-          <p:txBody>
-            <a:bodyPr wrap="none" rtlCol="0">
-              <a:spAutoFit/>
-            </a:bodyPr>
-            <a:lstStyle/>
-            <a:p>
-              <a:r>
-                <a:rPr lang="en-US" sz="1800" dirty="0"/>
-                <a:t>3</a:t>
-              </a:r>
-              <a:endParaRPr lang="en-US" sz="1800" dirty="0"/>
-            </a:p>
-          </p:txBody>
-        </p:sp>
-      </p:grpSp>
+            <a:off x="9626600" y="3776912"/>
+            <a:ext cx="2247900" cy="424914"/>
+          </a:xfrm>
+          <a:prstGeom prst="bentConnector3">
+            <a:avLst>
+              <a:gd name="adj1" fmla="val 99718"/>
+            </a:avLst>
+          </a:prstGeom>
+          <a:ln w="50800">
+            <a:solidFill>
+              <a:schemeClr val="tx1"/>
+            </a:solidFill>
+            <a:tailEnd type="triangle" w="lg" len="med"/>
+          </a:ln>
+          <a:effectLst/>
+        </p:spPr>
+        <p:style>
+          <a:lnRef idx="2">
+            <a:schemeClr val="accent1"/>
+          </a:lnRef>
+          <a:fillRef idx="0">
+            <a:schemeClr val="accent1"/>
+          </a:fillRef>
+          <a:effectRef idx="1">
+            <a:schemeClr val="accent1"/>
+          </a:effectRef>
+          <a:fontRef idx="minor">
+            <a:schemeClr val="tx1"/>
+          </a:fontRef>
+        </p:style>
+      </p:cxnSp>
+      <p:cxnSp>
+        <p:nvCxnSpPr>
+          <p:cNvPr id="140" name="Elbow Connector 139"/>
+          <p:cNvCxnSpPr/>
+          <p:nvPr/>
+        </p:nvCxnSpPr>
+        <p:spPr>
+          <a:xfrm flipV="1">
+            <a:off x="9613900" y="5375376"/>
+            <a:ext cx="3086100" cy="2042036"/>
+          </a:xfrm>
+          <a:prstGeom prst="bentConnector3">
+            <a:avLst>
+              <a:gd name="adj1" fmla="val 100617"/>
+            </a:avLst>
+          </a:prstGeom>
+          <a:ln w="50800">
+            <a:solidFill>
+              <a:schemeClr val="bg1">
+                <a:lumMod val="50000"/>
+              </a:schemeClr>
+            </a:solidFill>
+            <a:prstDash val="sysDot"/>
+            <a:tailEnd type="triangle" w="lg" len="med"/>
+          </a:ln>
+          <a:effectLst/>
+        </p:spPr>
+        <p:style>
+          <a:lnRef idx="2">
+            <a:schemeClr val="accent1"/>
+          </a:lnRef>
+          <a:fillRef idx="0">
+            <a:schemeClr val="accent1"/>
+          </a:fillRef>
+          <a:effectRef idx="1">
+            <a:schemeClr val="accent1"/>
+          </a:effectRef>
+          <a:fontRef idx="minor">
+            <a:schemeClr val="tx1"/>
+          </a:fontRef>
+        </p:style>
+      </p:cxnSp>
+      <p:cxnSp>
+        <p:nvCxnSpPr>
+          <p:cNvPr id="141" name="Elbow Connector 140"/>
+          <p:cNvCxnSpPr/>
+          <p:nvPr/>
+        </p:nvCxnSpPr>
+        <p:spPr>
+          <a:xfrm flipV="1">
+            <a:off x="9626600" y="5375376"/>
+            <a:ext cx="2247900" cy="754616"/>
+          </a:xfrm>
+          <a:prstGeom prst="bentConnector3">
+            <a:avLst>
+              <a:gd name="adj1" fmla="val 100283"/>
+            </a:avLst>
+          </a:prstGeom>
+          <a:ln w="50800">
+            <a:solidFill>
+              <a:schemeClr val="tx1"/>
+            </a:solidFill>
+            <a:tailEnd type="triangle" w="lg" len="med"/>
+          </a:ln>
+          <a:effectLst/>
+        </p:spPr>
+        <p:style>
+          <a:lnRef idx="2">
+            <a:schemeClr val="accent1"/>
+          </a:lnRef>
+          <a:fillRef idx="0">
+            <a:schemeClr val="accent1"/>
+          </a:fillRef>
+          <a:effectRef idx="1">
+            <a:schemeClr val="accent1"/>
+          </a:effectRef>
+          <a:fontRef idx="minor">
+            <a:schemeClr val="tx1"/>
+          </a:fontRef>
+        </p:style>
+      </p:cxnSp>
+      <p:cxnSp>
+        <p:nvCxnSpPr>
+          <p:cNvPr id="162" name="Straight Arrow Connector 161"/>
+          <p:cNvCxnSpPr/>
+          <p:nvPr/>
+        </p:nvCxnSpPr>
+        <p:spPr>
+          <a:xfrm flipV="1">
+            <a:off x="13398500" y="3810000"/>
+            <a:ext cx="584200" cy="565846"/>
+          </a:xfrm>
+          <a:prstGeom prst="straightConnector1">
+            <a:avLst/>
+          </a:prstGeom>
+          <a:ln w="50800">
+            <a:solidFill>
+              <a:schemeClr val="tx1"/>
+            </a:solidFill>
+            <a:tailEnd type="triangle" w="lg" len="med"/>
+          </a:ln>
+          <a:effectLst/>
+        </p:spPr>
+        <p:style>
+          <a:lnRef idx="2">
+            <a:schemeClr val="accent1"/>
+          </a:lnRef>
+          <a:fillRef idx="0">
+            <a:schemeClr val="accent1"/>
+          </a:fillRef>
+          <a:effectRef idx="1">
+            <a:schemeClr val="accent1"/>
+          </a:effectRef>
+          <a:fontRef idx="minor">
+            <a:schemeClr val="tx1"/>
+          </a:fontRef>
+        </p:style>
+      </p:cxnSp>
+      <p:cxnSp>
+        <p:nvCxnSpPr>
+          <p:cNvPr id="164" name="Straight Arrow Connector 163"/>
+          <p:cNvCxnSpPr/>
+          <p:nvPr/>
+        </p:nvCxnSpPr>
+        <p:spPr>
+          <a:xfrm>
+            <a:off x="13385800" y="5210383"/>
+            <a:ext cx="596900" cy="647591"/>
+          </a:xfrm>
+          <a:prstGeom prst="straightConnector1">
+            <a:avLst/>
+          </a:prstGeom>
+          <a:ln w="50800">
+            <a:solidFill>
+              <a:schemeClr val="tx1"/>
+            </a:solidFill>
+            <a:tailEnd type="triangle" w="lg" len="med"/>
+          </a:ln>
+          <a:effectLst/>
+        </p:spPr>
+        <p:style>
+          <a:lnRef idx="2">
+            <a:schemeClr val="accent1"/>
+          </a:lnRef>
+          <a:fillRef idx="0">
+            <a:schemeClr val="accent1"/>
+          </a:fillRef>
+          <a:effectRef idx="1">
+            <a:schemeClr val="accent1"/>
+          </a:effectRef>
+          <a:fontRef idx="minor">
+            <a:schemeClr val="tx1"/>
+          </a:fontRef>
+        </p:style>
+      </p:cxnSp>
+      <p:sp>
+        <p:nvSpPr>
+          <p:cNvPr id="173" name="TextBox 172"/>
+          <p:cNvSpPr txBox="1"/>
+          <p:nvPr/>
+        </p:nvSpPr>
+        <p:spPr>
+          <a:xfrm>
+            <a:off x="13792200" y="3843339"/>
+            <a:ext cx="2501900" cy="1200329"/>
+          </a:xfrm>
+          <a:prstGeom prst="rect">
+            <a:avLst/>
+          </a:prstGeom>
+          <a:noFill/>
+        </p:spPr>
+        <p:txBody>
+          <a:bodyPr wrap="square" rtlCol="0">
+            <a:spAutoFit/>
+          </a:bodyPr>
+          <a:lstStyle/>
+          <a:p>
+            <a:pPr algn="ctr"/>
+            <a:r>
+              <a:rPr lang="en-US" sz="1800" dirty="0" smtClean="0"/>
+              <a:t>Krona plots, </a:t>
+            </a:r>
+          </a:p>
+          <a:p>
+            <a:pPr algn="ctr"/>
+            <a:r>
+              <a:rPr lang="en-US" sz="1800" dirty="0"/>
+              <a:t>N</a:t>
+            </a:r>
+            <a:r>
+              <a:rPr lang="en-US" sz="1800" dirty="0" smtClean="0"/>
+              <a:t>umber of reads placed for each marker gene </a:t>
+            </a:r>
+            <a:endParaRPr lang="en-US" sz="1800" dirty="0"/>
+          </a:p>
+          <a:p>
+            <a:pPr algn="ctr"/>
+            <a:endParaRPr lang="en-US" sz="1800" dirty="0"/>
+          </a:p>
+        </p:txBody>
+      </p:sp>
+      <p:sp>
+        <p:nvSpPr>
+          <p:cNvPr id="174" name="TextBox 173"/>
+          <p:cNvSpPr txBox="1"/>
+          <p:nvPr/>
+        </p:nvSpPr>
+        <p:spPr>
+          <a:xfrm>
+            <a:off x="13792200" y="6822141"/>
+            <a:ext cx="2501900" cy="1200329"/>
+          </a:xfrm>
+          <a:prstGeom prst="rect">
+            <a:avLst/>
+          </a:prstGeom>
+          <a:noFill/>
+        </p:spPr>
+        <p:txBody>
+          <a:bodyPr wrap="square" rtlCol="0">
+            <a:spAutoFit/>
+          </a:bodyPr>
+          <a:lstStyle/>
+          <a:p>
+            <a:pPr algn="ctr"/>
+            <a:r>
+              <a:rPr lang="en-US" sz="1800" dirty="0" smtClean="0"/>
+              <a:t>Edge </a:t>
+            </a:r>
+            <a:r>
+              <a:rPr lang="en-US" sz="1800" dirty="0" err="1" smtClean="0"/>
+              <a:t>PCoA</a:t>
+            </a:r>
+            <a:r>
+              <a:rPr lang="en-US" sz="1800" dirty="0" smtClean="0"/>
+              <a:t>, </a:t>
+            </a:r>
+          </a:p>
+          <a:p>
+            <a:pPr algn="ctr"/>
+            <a:r>
+              <a:rPr lang="en-US" sz="1800" dirty="0" smtClean="0"/>
+              <a:t>Tree visualization, </a:t>
+            </a:r>
+          </a:p>
+          <a:p>
+            <a:pPr algn="ctr"/>
+            <a:r>
+              <a:rPr lang="en-US" sz="1800" dirty="0" smtClean="0"/>
+              <a:t>Bayes factor tests</a:t>
+            </a:r>
+            <a:endParaRPr lang="en-US" sz="1800" dirty="0"/>
+          </a:p>
+          <a:p>
+            <a:pPr algn="ctr"/>
+            <a:endParaRPr lang="en-US" sz="1800" dirty="0"/>
+          </a:p>
+        </p:txBody>
+      </p:sp>
     </p:spTree>
     <p:extLst>
       <p:ext uri="{BB962C8B-B14F-4D97-AF65-F5344CB8AC3E}">

</xml_diff>